<commit_message>
Phase 2: 지도/학군 연동 + 크롤러 v3 (fin.land SSR 파싱)
- 크롤러를 deprecated new.land.naver.com에서 fin.land.naver.com SSR HTML
  파싱 + m.land.naver.com 모바일 API 방식으로 전면 교체
- React Server Components(RSC) 데이터에서 단지정보 추출
  (세대수, 주차, 준공년도, 좌표, 사진 등)
- Phase 2 슬라이드 추가: 입지정보, 학군(초등), 학군(중고등)
- Playwright 브라우저 유틸리티 및 네이버지도/학군 크롤러 추가
- ComplexInfo 모델에 위도/경도 필드 추가
- 이미지 프로세서에 지도 마킹 함수 추가

Co-Authored-By: Claude Opus 4.6 <noreply@anthropic.com>
</commit_message>
<xml_diff>
--- a/output/거여현대테스트_브리핑자료_20260219.pptx
+++ b/output/거여현대테스트_브리핑자료_20260219.pptx
@@ -11,6 +11,9 @@
     <p:sldId id="259" r:id="rId10"/>
     <p:sldId id="260" r:id="rId11"/>
     <p:sldId id="261" r:id="rId12"/>
+    <p:sldId id="262" r:id="rId13"/>
+    <p:sldId id="263" r:id="rId14"/>
+    <p:sldId id="264" r:id="rId15"/>
   </p:sldIdLst>
   <p:sldSz cx="9144000" cy="6858000" type="screen4x3"/>
   <p:notesSz cx="6858000" cy="9144000"/>
@@ -4218,6 +4221,899 @@
 </file>
 
 <file path=ppt/slides/slide5.xml><?xml version="1.0" encoding="utf-8"?>
+<p:sld xmlns:a="http://schemas.openxmlformats.org/drawingml/2006/main" xmlns:p="http://schemas.openxmlformats.org/presentationml/2006/main" xmlns:r="http://schemas.openxmlformats.org/officeDocument/2006/relationships">
+  <p:cSld>
+    <p:spTree>
+      <p:nvGrpSpPr>
+        <p:cNvPr id="1" name=""/>
+        <p:cNvGrpSpPr/>
+        <p:nvPr/>
+      </p:nvGrpSpPr>
+      <p:grpSpPr/>
+      <p:sp>
+        <p:nvSpPr>
+          <p:cNvPr id="2" name="Rectangle 1"/>
+          <p:cNvSpPr/>
+          <p:nvPr/>
+        </p:nvSpPr>
+        <p:spPr>
+          <a:xfrm>
+            <a:off x="274320" y="320040"/>
+            <a:ext cx="101600" cy="365760"/>
+          </a:xfrm>
+          <a:prstGeom prst="rect">
+            <a:avLst/>
+          </a:prstGeom>
+          <a:solidFill>
+            <a:srgbClr val="C8102E"/>
+          </a:solidFill>
+          <a:ln>
+            <a:noFill/>
+          </a:ln>
+        </p:spPr>
+        <p:style>
+          <a:lnRef idx="1">
+            <a:schemeClr val="accent1"/>
+          </a:lnRef>
+          <a:fillRef idx="3">
+            <a:schemeClr val="accent1"/>
+          </a:fillRef>
+          <a:effectRef idx="2">
+            <a:schemeClr val="accent1"/>
+          </a:effectRef>
+          <a:fontRef idx="minor">
+            <a:schemeClr val="lt1"/>
+          </a:fontRef>
+        </p:style>
+        <p:txBody>
+          <a:bodyPr rtlCol="0" anchor="ctr"/>
+          <a:lstStyle/>
+          <a:p>
+            <a:pPr algn="ctr"/>
+          </a:p>
+        </p:txBody>
+      </p:sp>
+      <p:sp>
+        <p:nvSpPr>
+          <p:cNvPr id="3" name="TextBox 2"/>
+          <p:cNvSpPr txBox="1"/>
+          <p:nvPr/>
+        </p:nvSpPr>
+        <p:spPr>
+          <a:xfrm>
+            <a:off x="548640" y="274320"/>
+            <a:ext cx="5486400" cy="457200"/>
+          </a:xfrm>
+          <a:prstGeom prst="rect">
+            <a:avLst/>
+          </a:prstGeom>
+          <a:noFill/>
+        </p:spPr>
+        <p:txBody>
+          <a:bodyPr wrap="none">
+            <a:spAutoFit/>
+          </a:bodyPr>
+          <a:lstStyle/>
+          <a:p>
+            <a:pPr>
+              <a:defRPr sz="2200" b="1">
+                <a:solidFill>
+                  <a:srgbClr val="333333"/>
+                </a:solidFill>
+              </a:defRPr>
+            </a:pPr>
+            <a:r>
+              <a:t>샘플단지_605</a:t>
+            </a:r>
+          </a:p>
+        </p:txBody>
+      </p:sp>
+      <p:sp>
+        <p:nvSpPr>
+          <p:cNvPr id="4" name="TextBox 3"/>
+          <p:cNvSpPr txBox="1"/>
+          <p:nvPr/>
+        </p:nvSpPr>
+        <p:spPr>
+          <a:xfrm>
+            <a:off x="6858000" y="274320"/>
+            <a:ext cx="1828800" cy="457200"/>
+          </a:xfrm>
+          <a:prstGeom prst="rect">
+            <a:avLst/>
+          </a:prstGeom>
+          <a:noFill/>
+        </p:spPr>
+        <p:txBody>
+          <a:bodyPr wrap="none">
+            <a:spAutoFit/>
+          </a:bodyPr>
+          <a:lstStyle/>
+          <a:p>
+            <a:pPr algn="r">
+              <a:defRPr sz="1400">
+                <a:solidFill>
+                  <a:srgbClr val="999999"/>
+                </a:solidFill>
+              </a:defRPr>
+            </a:pPr>
+            <a:r>
+              <a:t>입지정보</a:t>
+            </a:r>
+          </a:p>
+        </p:txBody>
+      </p:sp>
+      <p:sp>
+        <p:nvSpPr>
+          <p:cNvPr id="5" name="Rectangle 4"/>
+          <p:cNvSpPr/>
+          <p:nvPr/>
+        </p:nvSpPr>
+        <p:spPr>
+          <a:xfrm>
+            <a:off x="274320" y="777240"/>
+            <a:ext cx="8595360" cy="12700"/>
+          </a:xfrm>
+          <a:prstGeom prst="rect">
+            <a:avLst/>
+          </a:prstGeom>
+          <a:solidFill>
+            <a:srgbClr val="E0E0E0"/>
+          </a:solidFill>
+          <a:ln>
+            <a:noFill/>
+          </a:ln>
+        </p:spPr>
+        <p:style>
+          <a:lnRef idx="1">
+            <a:schemeClr val="accent1"/>
+          </a:lnRef>
+          <a:fillRef idx="3">
+            <a:schemeClr val="accent1"/>
+          </a:fillRef>
+          <a:effectRef idx="2">
+            <a:schemeClr val="accent1"/>
+          </a:effectRef>
+          <a:fontRef idx="minor">
+            <a:schemeClr val="lt1"/>
+          </a:fontRef>
+        </p:style>
+        <p:txBody>
+          <a:bodyPr rtlCol="0" anchor="ctr"/>
+          <a:lstStyle/>
+          <a:p>
+            <a:pPr algn="ctr"/>
+          </a:p>
+        </p:txBody>
+      </p:sp>
+      <p:sp>
+        <p:nvSpPr>
+          <p:cNvPr id="6" name="TextBox 5"/>
+          <p:cNvSpPr txBox="1"/>
+          <p:nvPr/>
+        </p:nvSpPr>
+        <p:spPr>
+          <a:xfrm>
+            <a:off x="457200" y="1005840"/>
+            <a:ext cx="8229600" cy="731520"/>
+          </a:xfrm>
+          <a:prstGeom prst="rect">
+            <a:avLst/>
+          </a:prstGeom>
+          <a:noFill/>
+        </p:spPr>
+        <p:txBody>
+          <a:bodyPr wrap="square">
+            <a:spAutoFit/>
+          </a:bodyPr>
+          <a:lstStyle/>
+          <a:p>
+            <a:pPr>
+              <a:spcAft>
+                <a:spcPts val="400"/>
+              </a:spcAft>
+              <a:defRPr sz="1400" b="1">
+                <a:solidFill>
+                  <a:srgbClr val="333333"/>
+                </a:solidFill>
+              </a:defRPr>
+            </a:pPr>
+            <a:r>
+              <a:t>정보 없음 - 도보 0분</a:t>
+            </a:r>
+          </a:p>
+          <a:p>
+            <a:pPr>
+              <a:defRPr sz="1400" b="1">
+                <a:solidFill>
+                  <a:srgbClr val="333333"/>
+                </a:solidFill>
+              </a:defRPr>
+            </a:pPr>
+            <a:r>
+              <a:t>강남역 - 대중교통 0분</a:t>
+            </a:r>
+          </a:p>
+        </p:txBody>
+      </p:sp>
+      <p:sp>
+        <p:nvSpPr>
+          <p:cNvPr id="7" name="TextBox 6"/>
+          <p:cNvSpPr txBox="1"/>
+          <p:nvPr/>
+        </p:nvSpPr>
+        <p:spPr>
+          <a:xfrm>
+            <a:off x="457200" y="1828800"/>
+            <a:ext cx="3931920" cy="274320"/>
+          </a:xfrm>
+          <a:prstGeom prst="rect">
+            <a:avLst/>
+          </a:prstGeom>
+          <a:noFill/>
+        </p:spPr>
+        <p:txBody>
+          <a:bodyPr wrap="none">
+            <a:spAutoFit/>
+          </a:bodyPr>
+          <a:lstStyle/>
+          <a:p>
+            <a:pPr>
+              <a:defRPr sz="1000" b="1">
+                <a:solidFill>
+                  <a:srgbClr val="C8102E"/>
+                </a:solidFill>
+              </a:defRPr>
+            </a:pPr>
+            <a:r>
+              <a:t>도보 경로</a:t>
+            </a:r>
+          </a:p>
+        </p:txBody>
+      </p:sp>
+      <p:pic>
+        <p:nvPicPr>
+          <p:cNvPr id="8" name="Picture 7" descr="walk_route.png"/>
+          <p:cNvPicPr>
+            <a:picLocks noChangeAspect="1"/>
+          </p:cNvPicPr>
+          <p:nvPr/>
+        </p:nvPicPr>
+        <p:blipFill>
+          <a:blip r:embed="rId2"/>
+          <a:stretch>
+            <a:fillRect/>
+          </a:stretch>
+        </p:blipFill>
+        <p:spPr>
+          <a:xfrm>
+            <a:off x="457200" y="2103120"/>
+            <a:ext cx="3931920" cy="3200400"/>
+          </a:xfrm>
+          <a:prstGeom prst="rect">
+            <a:avLst/>
+          </a:prstGeom>
+        </p:spPr>
+      </p:pic>
+      <p:sp>
+        <p:nvSpPr>
+          <p:cNvPr id="9" name="TextBox 8"/>
+          <p:cNvSpPr txBox="1"/>
+          <p:nvPr/>
+        </p:nvSpPr>
+        <p:spPr>
+          <a:xfrm>
+            <a:off x="4754880" y="1828800"/>
+            <a:ext cx="3931920" cy="274320"/>
+          </a:xfrm>
+          <a:prstGeom prst="rect">
+            <a:avLst/>
+          </a:prstGeom>
+          <a:noFill/>
+        </p:spPr>
+        <p:txBody>
+          <a:bodyPr wrap="none">
+            <a:spAutoFit/>
+          </a:bodyPr>
+          <a:lstStyle/>
+          <a:p>
+            <a:pPr>
+              <a:defRPr sz="1000" b="1">
+                <a:solidFill>
+                  <a:srgbClr val="C8102E"/>
+                </a:solidFill>
+              </a:defRPr>
+            </a:pPr>
+            <a:r>
+              <a:t>대중교통 경로 (→ 강남역)</a:t>
+            </a:r>
+          </a:p>
+        </p:txBody>
+      </p:sp>
+      <p:pic>
+        <p:nvPicPr>
+          <p:cNvPr id="10" name="Picture 9" descr="transit_route.png"/>
+          <p:cNvPicPr>
+            <a:picLocks noChangeAspect="1"/>
+          </p:cNvPicPr>
+          <p:nvPr/>
+        </p:nvPicPr>
+        <p:blipFill>
+          <a:blip r:embed="rId3"/>
+          <a:stretch>
+            <a:fillRect/>
+          </a:stretch>
+        </p:blipFill>
+        <p:spPr>
+          <a:xfrm>
+            <a:off x="4754880" y="2103120"/>
+            <a:ext cx="3931920" cy="3200400"/>
+          </a:xfrm>
+          <a:prstGeom prst="rect">
+            <a:avLst/>
+          </a:prstGeom>
+        </p:spPr>
+      </p:pic>
+      <p:sp>
+        <p:nvSpPr>
+          <p:cNvPr id="11" name="TextBox 10"/>
+          <p:cNvSpPr txBox="1"/>
+          <p:nvPr/>
+        </p:nvSpPr>
+        <p:spPr>
+          <a:xfrm>
+            <a:off x="457200" y="5943600"/>
+            <a:ext cx="4572000" cy="274320"/>
+          </a:xfrm>
+          <a:prstGeom prst="rect">
+            <a:avLst/>
+          </a:prstGeom>
+          <a:noFill/>
+        </p:spPr>
+        <p:txBody>
+          <a:bodyPr wrap="none">
+            <a:spAutoFit/>
+          </a:bodyPr>
+          <a:lstStyle/>
+          <a:p>
+            <a:pPr>
+              <a:defRPr sz="800">
+                <a:solidFill>
+                  <a:srgbClr val="999999"/>
+                </a:solidFill>
+              </a:defRPr>
+            </a:pPr>
+            <a:r>
+              <a:t>*네이버지도 (https://map.naver.com)</a:t>
+            </a:r>
+          </a:p>
+        </p:txBody>
+      </p:sp>
+    </p:spTree>
+  </p:cSld>
+  <p:clrMapOvr>
+    <a:masterClrMapping/>
+  </p:clrMapOvr>
+</p:sld>
+</file>
+
+<file path=ppt/slides/slide6.xml><?xml version="1.0" encoding="utf-8"?>
+<p:sld xmlns:a="http://schemas.openxmlformats.org/drawingml/2006/main" xmlns:p="http://schemas.openxmlformats.org/presentationml/2006/main" xmlns:r="http://schemas.openxmlformats.org/officeDocument/2006/relationships">
+  <p:cSld>
+    <p:spTree>
+      <p:nvGrpSpPr>
+        <p:cNvPr id="1" name=""/>
+        <p:cNvGrpSpPr/>
+        <p:nvPr/>
+      </p:nvGrpSpPr>
+      <p:grpSpPr/>
+      <p:sp>
+        <p:nvSpPr>
+          <p:cNvPr id="2" name="Rectangle 1"/>
+          <p:cNvSpPr/>
+          <p:nvPr/>
+        </p:nvSpPr>
+        <p:spPr>
+          <a:xfrm>
+            <a:off x="274320" y="320040"/>
+            <a:ext cx="101600" cy="365760"/>
+          </a:xfrm>
+          <a:prstGeom prst="rect">
+            <a:avLst/>
+          </a:prstGeom>
+          <a:solidFill>
+            <a:srgbClr val="C8102E"/>
+          </a:solidFill>
+          <a:ln>
+            <a:noFill/>
+          </a:ln>
+        </p:spPr>
+        <p:style>
+          <a:lnRef idx="1">
+            <a:schemeClr val="accent1"/>
+          </a:lnRef>
+          <a:fillRef idx="3">
+            <a:schemeClr val="accent1"/>
+          </a:fillRef>
+          <a:effectRef idx="2">
+            <a:schemeClr val="accent1"/>
+          </a:effectRef>
+          <a:fontRef idx="minor">
+            <a:schemeClr val="lt1"/>
+          </a:fontRef>
+        </p:style>
+        <p:txBody>
+          <a:bodyPr rtlCol="0" anchor="ctr"/>
+          <a:lstStyle/>
+          <a:p>
+            <a:pPr algn="ctr"/>
+          </a:p>
+        </p:txBody>
+      </p:sp>
+      <p:sp>
+        <p:nvSpPr>
+          <p:cNvPr id="3" name="TextBox 2"/>
+          <p:cNvSpPr txBox="1"/>
+          <p:nvPr/>
+        </p:nvSpPr>
+        <p:spPr>
+          <a:xfrm>
+            <a:off x="548640" y="274320"/>
+            <a:ext cx="5486400" cy="457200"/>
+          </a:xfrm>
+          <a:prstGeom prst="rect">
+            <a:avLst/>
+          </a:prstGeom>
+          <a:noFill/>
+        </p:spPr>
+        <p:txBody>
+          <a:bodyPr wrap="none">
+            <a:spAutoFit/>
+          </a:bodyPr>
+          <a:lstStyle/>
+          <a:p>
+            <a:pPr>
+              <a:defRPr sz="2200" b="1">
+                <a:solidFill>
+                  <a:srgbClr val="333333"/>
+                </a:solidFill>
+              </a:defRPr>
+            </a:pPr>
+            <a:r>
+              <a:t>학구도(초등학교)</a:t>
+            </a:r>
+          </a:p>
+        </p:txBody>
+      </p:sp>
+      <p:sp>
+        <p:nvSpPr>
+          <p:cNvPr id="4" name="TextBox 3"/>
+          <p:cNvSpPr txBox="1"/>
+          <p:nvPr/>
+        </p:nvSpPr>
+        <p:spPr>
+          <a:xfrm>
+            <a:off x="6858000" y="274320"/>
+            <a:ext cx="1828800" cy="457200"/>
+          </a:xfrm>
+          <a:prstGeom prst="rect">
+            <a:avLst/>
+          </a:prstGeom>
+          <a:noFill/>
+        </p:spPr>
+        <p:txBody>
+          <a:bodyPr wrap="none">
+            <a:spAutoFit/>
+          </a:bodyPr>
+          <a:lstStyle/>
+          <a:p>
+            <a:pPr algn="r">
+              <a:defRPr sz="1400">
+                <a:solidFill>
+                  <a:srgbClr val="999999"/>
+                </a:solidFill>
+              </a:defRPr>
+            </a:pPr>
+            <a:r>
+              <a:t>학군지도</a:t>
+            </a:r>
+          </a:p>
+        </p:txBody>
+      </p:sp>
+      <p:sp>
+        <p:nvSpPr>
+          <p:cNvPr id="5" name="Rectangle 4"/>
+          <p:cNvSpPr/>
+          <p:nvPr/>
+        </p:nvSpPr>
+        <p:spPr>
+          <a:xfrm>
+            <a:off x="274320" y="777240"/>
+            <a:ext cx="8595360" cy="12700"/>
+          </a:xfrm>
+          <a:prstGeom prst="rect">
+            <a:avLst/>
+          </a:prstGeom>
+          <a:solidFill>
+            <a:srgbClr val="E0E0E0"/>
+          </a:solidFill>
+          <a:ln>
+            <a:noFill/>
+          </a:ln>
+        </p:spPr>
+        <p:style>
+          <a:lnRef idx="1">
+            <a:schemeClr val="accent1"/>
+          </a:lnRef>
+          <a:fillRef idx="3">
+            <a:schemeClr val="accent1"/>
+          </a:fillRef>
+          <a:effectRef idx="2">
+            <a:schemeClr val="accent1"/>
+          </a:effectRef>
+          <a:fontRef idx="minor">
+            <a:schemeClr val="lt1"/>
+          </a:fontRef>
+        </p:style>
+        <p:txBody>
+          <a:bodyPr rtlCol="0" anchor="ctr"/>
+          <a:lstStyle/>
+          <a:p>
+            <a:pPr algn="ctr"/>
+          </a:p>
+        </p:txBody>
+      </p:sp>
+      <p:pic>
+        <p:nvPicPr>
+          <p:cNvPr id="6" name="Picture 5" descr="elementary_zone.png"/>
+          <p:cNvPicPr>
+            <a:picLocks noChangeAspect="1"/>
+          </p:cNvPicPr>
+          <p:nvPr/>
+        </p:nvPicPr>
+        <p:blipFill>
+          <a:blip r:embed="rId2"/>
+          <a:stretch>
+            <a:fillRect/>
+          </a:stretch>
+        </p:blipFill>
+        <p:spPr>
+          <a:xfrm>
+            <a:off x="457200" y="1097280"/>
+            <a:ext cx="5943600" cy="4389120"/>
+          </a:xfrm>
+          <a:prstGeom prst="rect">
+            <a:avLst/>
+          </a:prstGeom>
+        </p:spPr>
+      </p:pic>
+      <p:sp>
+        <p:nvSpPr>
+          <p:cNvPr id="7" name="TextBox 6"/>
+          <p:cNvSpPr txBox="1"/>
+          <p:nvPr/>
+        </p:nvSpPr>
+        <p:spPr>
+          <a:xfrm>
+            <a:off x="6675120" y="1371600"/>
+            <a:ext cx="2011680" cy="1371600"/>
+          </a:xfrm>
+          <a:prstGeom prst="rect">
+            <a:avLst/>
+          </a:prstGeom>
+          <a:noFill/>
+        </p:spPr>
+        <p:txBody>
+          <a:bodyPr wrap="square">
+            <a:spAutoFit/>
+          </a:bodyPr>
+          <a:lstStyle/>
+          <a:p>
+            <a:pPr>
+              <a:spcAft>
+                <a:spcPts val="800"/>
+              </a:spcAft>
+              <a:defRPr sz="1100" b="1">
+                <a:solidFill>
+                  <a:srgbClr val="C8102E"/>
+                </a:solidFill>
+              </a:defRPr>
+            </a:pPr>
+            <a:r>
+              <a:t>배정 초등학교</a:t>
+            </a:r>
+          </a:p>
+          <a:p>
+            <a:pPr>
+              <a:defRPr sz="1300" b="1">
+                <a:solidFill>
+                  <a:srgbClr val="333333"/>
+                </a:solidFill>
+              </a:defRPr>
+            </a:pPr>
+            <a:r>
+              <a:t>샘플단지_605 배정 초등학교</a:t>
+            </a:r>
+          </a:p>
+        </p:txBody>
+      </p:sp>
+      <p:sp>
+        <p:nvSpPr>
+          <p:cNvPr id="8" name="TextBox 7"/>
+          <p:cNvSpPr txBox="1"/>
+          <p:nvPr/>
+        </p:nvSpPr>
+        <p:spPr>
+          <a:xfrm>
+            <a:off x="457200" y="5943600"/>
+            <a:ext cx="4572000" cy="274320"/>
+          </a:xfrm>
+          <a:prstGeom prst="rect">
+            <a:avLst/>
+          </a:prstGeom>
+          <a:noFill/>
+        </p:spPr>
+        <p:txBody>
+          <a:bodyPr wrap="none">
+            <a:spAutoFit/>
+          </a:bodyPr>
+          <a:lstStyle/>
+          <a:p>
+            <a:pPr>
+              <a:defRPr sz="800">
+                <a:solidFill>
+                  <a:srgbClr val="999999"/>
+                </a:solidFill>
+              </a:defRPr>
+            </a:pPr>
+            <a:r>
+              <a:t>*학구도안내서비스 (https://schoolzone.emac.kr)  *네이버지도</a:t>
+            </a:r>
+          </a:p>
+        </p:txBody>
+      </p:sp>
+    </p:spTree>
+  </p:cSld>
+  <p:clrMapOvr>
+    <a:masterClrMapping/>
+  </p:clrMapOvr>
+</p:sld>
+</file>
+
+<file path=ppt/slides/slide7.xml><?xml version="1.0" encoding="utf-8"?>
+<p:sld xmlns:a="http://schemas.openxmlformats.org/drawingml/2006/main" xmlns:p="http://schemas.openxmlformats.org/presentationml/2006/main" xmlns:r="http://schemas.openxmlformats.org/officeDocument/2006/relationships">
+  <p:cSld>
+    <p:spTree>
+      <p:nvGrpSpPr>
+        <p:cNvPr id="1" name=""/>
+        <p:cNvGrpSpPr/>
+        <p:nvPr/>
+      </p:nvGrpSpPr>
+      <p:grpSpPr/>
+      <p:sp>
+        <p:nvSpPr>
+          <p:cNvPr id="2" name="Rectangle 1"/>
+          <p:cNvSpPr/>
+          <p:nvPr/>
+        </p:nvSpPr>
+        <p:spPr>
+          <a:xfrm>
+            <a:off x="274320" y="320040"/>
+            <a:ext cx="101600" cy="365760"/>
+          </a:xfrm>
+          <a:prstGeom prst="rect">
+            <a:avLst/>
+          </a:prstGeom>
+          <a:solidFill>
+            <a:srgbClr val="C8102E"/>
+          </a:solidFill>
+          <a:ln>
+            <a:noFill/>
+          </a:ln>
+        </p:spPr>
+        <p:style>
+          <a:lnRef idx="1">
+            <a:schemeClr val="accent1"/>
+          </a:lnRef>
+          <a:fillRef idx="3">
+            <a:schemeClr val="accent1"/>
+          </a:fillRef>
+          <a:effectRef idx="2">
+            <a:schemeClr val="accent1"/>
+          </a:effectRef>
+          <a:fontRef idx="minor">
+            <a:schemeClr val="lt1"/>
+          </a:fontRef>
+        </p:style>
+        <p:txBody>
+          <a:bodyPr rtlCol="0" anchor="ctr"/>
+          <a:lstStyle/>
+          <a:p>
+            <a:pPr algn="ctr"/>
+          </a:p>
+        </p:txBody>
+      </p:sp>
+      <p:sp>
+        <p:nvSpPr>
+          <p:cNvPr id="3" name="TextBox 2"/>
+          <p:cNvSpPr txBox="1"/>
+          <p:nvPr/>
+        </p:nvSpPr>
+        <p:spPr>
+          <a:xfrm>
+            <a:off x="548640" y="274320"/>
+            <a:ext cx="5486400" cy="457200"/>
+          </a:xfrm>
+          <a:prstGeom prst="rect">
+            <a:avLst/>
+          </a:prstGeom>
+          <a:noFill/>
+        </p:spPr>
+        <p:txBody>
+          <a:bodyPr wrap="none">
+            <a:spAutoFit/>
+          </a:bodyPr>
+          <a:lstStyle/>
+          <a:p>
+            <a:pPr>
+              <a:defRPr sz="2200" b="1">
+                <a:solidFill>
+                  <a:srgbClr val="333333"/>
+                </a:solidFill>
+              </a:defRPr>
+            </a:pPr>
+            <a:r>
+              <a:t>학군지도(중·고등학교)</a:t>
+            </a:r>
+          </a:p>
+        </p:txBody>
+      </p:sp>
+      <p:sp>
+        <p:nvSpPr>
+          <p:cNvPr id="4" name="TextBox 3"/>
+          <p:cNvSpPr txBox="1"/>
+          <p:nvPr/>
+        </p:nvSpPr>
+        <p:spPr>
+          <a:xfrm>
+            <a:off x="6858000" y="274320"/>
+            <a:ext cx="1828800" cy="457200"/>
+          </a:xfrm>
+          <a:prstGeom prst="rect">
+            <a:avLst/>
+          </a:prstGeom>
+          <a:noFill/>
+        </p:spPr>
+        <p:txBody>
+          <a:bodyPr wrap="none">
+            <a:spAutoFit/>
+          </a:bodyPr>
+          <a:lstStyle/>
+          <a:p>
+            <a:pPr algn="r">
+              <a:defRPr sz="1400">
+                <a:solidFill>
+                  <a:srgbClr val="999999"/>
+                </a:solidFill>
+              </a:defRPr>
+            </a:pPr>
+            <a:r>
+              <a:t>학군지도</a:t>
+            </a:r>
+          </a:p>
+        </p:txBody>
+      </p:sp>
+      <p:sp>
+        <p:nvSpPr>
+          <p:cNvPr id="5" name="Rectangle 4"/>
+          <p:cNvSpPr/>
+          <p:nvPr/>
+        </p:nvSpPr>
+        <p:spPr>
+          <a:xfrm>
+            <a:off x="274320" y="777240"/>
+            <a:ext cx="8595360" cy="12700"/>
+          </a:xfrm>
+          <a:prstGeom prst="rect">
+            <a:avLst/>
+          </a:prstGeom>
+          <a:solidFill>
+            <a:srgbClr val="E0E0E0"/>
+          </a:solidFill>
+          <a:ln>
+            <a:noFill/>
+          </a:ln>
+        </p:spPr>
+        <p:style>
+          <a:lnRef idx="1">
+            <a:schemeClr val="accent1"/>
+          </a:lnRef>
+          <a:fillRef idx="3">
+            <a:schemeClr val="accent1"/>
+          </a:fillRef>
+          <a:effectRef idx="2">
+            <a:schemeClr val="accent1"/>
+          </a:effectRef>
+          <a:fontRef idx="minor">
+            <a:schemeClr val="lt1"/>
+          </a:fontRef>
+        </p:style>
+        <p:txBody>
+          <a:bodyPr rtlCol="0" anchor="ctr"/>
+          <a:lstStyle/>
+          <a:p>
+            <a:pPr algn="ctr"/>
+          </a:p>
+        </p:txBody>
+      </p:sp>
+      <p:pic>
+        <p:nvPicPr>
+          <p:cNvPr id="6" name="Picture 5" descr="middle_high_zone.png"/>
+          <p:cNvPicPr>
+            <a:picLocks noChangeAspect="1"/>
+          </p:cNvPicPr>
+          <p:nvPr/>
+        </p:nvPicPr>
+        <p:blipFill>
+          <a:blip r:embed="rId2"/>
+          <a:stretch>
+            <a:fillRect/>
+          </a:stretch>
+        </p:blipFill>
+        <p:spPr>
+          <a:xfrm>
+            <a:off x="457200" y="1097280"/>
+            <a:ext cx="8229600" cy="4389120"/>
+          </a:xfrm>
+          <a:prstGeom prst="rect">
+            <a:avLst/>
+          </a:prstGeom>
+        </p:spPr>
+      </p:pic>
+      <p:sp>
+        <p:nvSpPr>
+          <p:cNvPr id="7" name="TextBox 6"/>
+          <p:cNvSpPr txBox="1"/>
+          <p:nvPr/>
+        </p:nvSpPr>
+        <p:spPr>
+          <a:xfrm>
+            <a:off x="457200" y="5943600"/>
+            <a:ext cx="4572000" cy="274320"/>
+          </a:xfrm>
+          <a:prstGeom prst="rect">
+            <a:avLst/>
+          </a:prstGeom>
+          <a:noFill/>
+        </p:spPr>
+        <p:txBody>
+          <a:bodyPr wrap="none">
+            <a:spAutoFit/>
+          </a:bodyPr>
+          <a:lstStyle/>
+          <a:p>
+            <a:pPr>
+              <a:defRPr sz="800">
+                <a:solidFill>
+                  <a:srgbClr val="999999"/>
+                </a:solidFill>
+              </a:defRPr>
+            </a:pPr>
+            <a:r>
+              <a:t>*아실 (https://asil.kr)</a:t>
+            </a:r>
+          </a:p>
+        </p:txBody>
+      </p:sp>
+    </p:spTree>
+  </p:cSld>
+  <p:clrMapOvr>
+    <a:masterClrMapping/>
+  </p:clrMapOvr>
+</p:sld>
+</file>
+
+<file path=ppt/slides/slide8.xml><?xml version="1.0" encoding="utf-8"?>
 <p:sld xmlns:a="http://schemas.openxmlformats.org/drawingml/2006/main" xmlns:p="http://schemas.openxmlformats.org/presentationml/2006/main" xmlns:r="http://schemas.openxmlformats.org/officeDocument/2006/relationships">
   <p:cSld>
     <p:spTree>
@@ -4890,7 +5786,7 @@
 </p:sld>
 </file>
 
-<file path=ppt/slides/slide6.xml><?xml version="1.0" encoding="utf-8"?>
+<file path=ppt/slides/slide9.xml><?xml version="1.0" encoding="utf-8"?>
 <p:sld xmlns:a="http://schemas.openxmlformats.org/drawingml/2006/main" xmlns:p="http://schemas.openxmlformats.org/presentationml/2006/main" xmlns:r="http://schemas.openxmlformats.org/officeDocument/2006/relationships">
   <p:cSld>
     <p:spTree>

</xml_diff>